<commit_message>
Revise PPT and code
</commit_message>
<xml_diff>
--- a/26bGit.pptx
+++ b/26bGit.pptx
@@ -274,7 +274,7 @@
           <a:p>
             <a:fld id="{878E5828-5D53-4C69-997D-7A1DD0846B44}" type="datetimeFigureOut">
               <a:rPr lang="en-US" smtClean="0"/>
-              <a:t>11/12/2020</a:t>
+              <a:t>11/17/2020</a:t>
             </a:fld>
             <a:endParaRPr lang="en-US" dirty="0"/>
           </a:p>
@@ -1038,7 +1038,7 @@
           <a:p>
             <a:fld id="{AAAE48C7-9ECF-49DA-961C-1BB542692A3D}" type="datetime1">
               <a:rPr lang="en-US" smtClean="0"/>
-              <a:t>11/12/2020</a:t>
+              <a:t>11/17/2020</a:t>
             </a:fld>
             <a:endParaRPr lang="en-US" dirty="0"/>
           </a:p>
@@ -10720,7 +10720,7 @@
           <a:p>
             <a:fld id="{37172AB4-3AFB-4B32-AC1B-C168BD4AD9A6}" type="datetime1">
               <a:rPr lang="en-US" smtClean="0"/>
-              <a:t>11/12/2020</a:t>
+              <a:t>11/17/2020</a:t>
             </a:fld>
             <a:endParaRPr lang="en-US" dirty="0"/>
           </a:p>
@@ -10916,7 +10916,7 @@
           <a:p>
             <a:fld id="{478EEA67-B4D0-43AC-B433-310AF18A87FC}" type="datetime1">
               <a:rPr lang="en-US" smtClean="0"/>
-              <a:t>11/12/2020</a:t>
+              <a:t>11/17/2020</a:t>
             </a:fld>
             <a:endParaRPr lang="en-US" dirty="0"/>
           </a:p>
@@ -11103,7 +11103,7 @@
           <a:p>
             <a:fld id="{920F995E-3A7A-4F7E-BD75-B90012069565}" type="datetime1">
               <a:rPr lang="en-US" smtClean="0"/>
-              <a:t>11/12/2020</a:t>
+              <a:t>11/17/2020</a:t>
             </a:fld>
             <a:endParaRPr lang="en-US" dirty="0"/>
           </a:p>
@@ -11312,7 +11312,7 @@
           <a:p>
             <a:fld id="{7EBEF466-E8BF-404A-B28F-5217BAB38006}" type="datetime1">
               <a:rPr lang="en-US" smtClean="0"/>
-              <a:t>11/12/2020</a:t>
+              <a:t>11/17/2020</a:t>
             </a:fld>
             <a:endParaRPr lang="en-US" dirty="0"/>
           </a:p>
@@ -11615,7 +11615,7 @@
           <a:p>
             <a:fld id="{F43C1EF0-0680-4FA1-8C29-DE5DAFD110A6}" type="datetime1">
               <a:rPr lang="en-US" smtClean="0"/>
-              <a:t>11/12/2020</a:t>
+              <a:t>11/17/2020</a:t>
             </a:fld>
             <a:endParaRPr lang="en-US" dirty="0"/>
           </a:p>
@@ -12057,7 +12057,7 @@
           <a:p>
             <a:fld id="{2D6846BE-EC03-4D8D-B925-17DCACD46035}" type="datetime1">
               <a:rPr lang="en-US" smtClean="0"/>
-              <a:t>11/12/2020</a:t>
+              <a:t>11/17/2020</a:t>
             </a:fld>
             <a:endParaRPr lang="en-US" dirty="0"/>
           </a:p>
@@ -12192,7 +12192,7 @@
           <a:p>
             <a:fld id="{FE703B82-B254-4D3D-8A0C-B5D5DE1FDDAE}" type="datetime1">
               <a:rPr lang="en-US" smtClean="0"/>
-              <a:t>11/12/2020</a:t>
+              <a:t>11/17/2020</a:t>
             </a:fld>
             <a:endParaRPr lang="en-US" dirty="0"/>
           </a:p>
@@ -12305,7 +12305,7 @@
           <a:p>
             <a:fld id="{5D44F180-9DB1-44CE-8489-235AB877DE85}" type="datetime1">
               <a:rPr lang="en-US" smtClean="0"/>
-              <a:t>11/12/2020</a:t>
+              <a:t>11/17/2020</a:t>
             </a:fld>
             <a:endParaRPr lang="en-US" dirty="0"/>
           </a:p>
@@ -12598,7 +12598,7 @@
           <a:p>
             <a:fld id="{C7F60802-5F16-4EE1-8D15-A551C148E595}" type="datetime1">
               <a:rPr lang="en-US" smtClean="0"/>
-              <a:t>11/12/2020</a:t>
+              <a:t>11/17/2020</a:t>
             </a:fld>
             <a:endParaRPr lang="en-US" dirty="0"/>
           </a:p>
@@ -12872,7 +12872,7 @@
           <a:p>
             <a:fld id="{ED55C737-EA7C-4E15-9C32-9DB90E22946A}" type="datetime1">
               <a:rPr lang="en-US" smtClean="0"/>
-              <a:t>11/12/2020</a:t>
+              <a:t>11/17/2020</a:t>
             </a:fld>
             <a:endParaRPr lang="en-US" dirty="0"/>
           </a:p>
@@ -13159,7 +13159,7 @@
           <a:p>
             <a:fld id="{681C472A-FDC1-499D-AA2E-2EE2A0332C66}" type="datetime1">
               <a:rPr lang="en-US" smtClean="0"/>
-              <a:t>11/12/2020</a:t>
+              <a:t>11/17/2020</a:t>
             </a:fld>
             <a:endParaRPr lang="en-US" dirty="0"/>
           </a:p>
@@ -22257,6 +22257,31 @@
       </p:grpSpPr>
       <p:sp>
         <p:nvSpPr>
+          <p:cNvPr id="3" name="Content Placeholder 2">
+            <a:extLst>
+              <a:ext uri="{FF2B5EF4-FFF2-40B4-BE49-F238E27FC236}">
+                <a16:creationId xmlns:a16="http://schemas.microsoft.com/office/drawing/2014/main" id="{E483C1D8-E286-4B33-AABB-05DFDD37E7B5}"/>
+              </a:ext>
+            </a:extLst>
+          </p:cNvPr>
+          <p:cNvSpPr>
+            <a:spLocks noGrp="1"/>
+          </p:cNvSpPr>
+          <p:nvPr>
+            <p:ph idx="1"/>
+          </p:nvPr>
+        </p:nvSpPr>
+        <p:spPr/>
+        <p:txBody>
+          <a:bodyPr/>
+          <a:lstStyle/>
+          <a:p>
+            <a:endParaRPr lang="en-US" dirty="0"/>
+          </a:p>
+        </p:txBody>
+      </p:sp>
+      <p:sp>
+        <p:nvSpPr>
           <p:cNvPr id="2" name="Title 1"/>
           <p:cNvSpPr>
             <a:spLocks noGrp="1"/>
@@ -22277,32 +22302,6 @@
           </a:p>
         </p:txBody>
       </p:sp>
-      <p:pic>
-        <p:nvPicPr>
-          <p:cNvPr id="5" name="Content Placeholder 4"/>
-          <p:cNvPicPr>
-            <a:picLocks noGrp="1" noChangeAspect="1"/>
-          </p:cNvPicPr>
-          <p:nvPr>
-            <p:ph idx="1"/>
-          </p:nvPr>
-        </p:nvPicPr>
-        <p:blipFill>
-          <a:blip r:embed="rId2"/>
-          <a:stretch>
-            <a:fillRect/>
-          </a:stretch>
-        </p:blipFill>
-        <p:spPr>
-          <a:xfrm>
-            <a:off x="1330585" y="1584773"/>
-            <a:ext cx="4357119" cy="2558863"/>
-          </a:xfrm>
-          <a:prstGeom prst="rect">
-            <a:avLst/>
-          </a:prstGeom>
-        </p:spPr>
-      </p:pic>
       <p:sp>
         <p:nvSpPr>
           <p:cNvPr id="4" name="Slide Number Placeholder 3"/>
@@ -22322,76 +22321,6 @@
               <a:rPr lang="en-US" smtClean="0"/>
               <a:t>10</a:t>
             </a:fld>
-            <a:endParaRPr lang="en-US" dirty="0"/>
-          </a:p>
-        </p:txBody>
-      </p:sp>
-      <p:pic>
-        <p:nvPicPr>
-          <p:cNvPr id="6" name="Picture 5"/>
-          <p:cNvPicPr>
-            <a:picLocks noChangeAspect="1"/>
-          </p:cNvPicPr>
-          <p:nvPr/>
-        </p:nvPicPr>
-        <p:blipFill>
-          <a:blip r:embed="rId3"/>
-          <a:stretch>
-            <a:fillRect/>
-          </a:stretch>
-        </p:blipFill>
-        <p:spPr>
-          <a:xfrm>
-            <a:off x="6451601" y="1584774"/>
-            <a:ext cx="4357119" cy="2558863"/>
-          </a:xfrm>
-          <a:prstGeom prst="rect">
-            <a:avLst/>
-          </a:prstGeom>
-        </p:spPr>
-      </p:pic>
-      <p:sp>
-        <p:nvSpPr>
-          <p:cNvPr id="7" name="Rectangle 6"/>
-          <p:cNvSpPr/>
-          <p:nvPr/>
-        </p:nvSpPr>
-        <p:spPr>
-          <a:xfrm>
-            <a:off x="6565557" y="3303378"/>
-            <a:ext cx="1820562" cy="115330"/>
-          </a:xfrm>
-          <a:prstGeom prst="rect">
-            <a:avLst/>
-          </a:prstGeom>
-          <a:noFill/>
-          <a:ln>
-            <a:solidFill>
-              <a:srgbClr val="FF0000"/>
-            </a:solidFill>
-          </a:ln>
-        </p:spPr>
-        <p:style>
-          <a:lnRef idx="2">
-            <a:schemeClr val="accent1">
-              <a:shade val="50000"/>
-            </a:schemeClr>
-          </a:lnRef>
-          <a:fillRef idx="1">
-            <a:schemeClr val="accent1"/>
-          </a:fillRef>
-          <a:effectRef idx="0">
-            <a:schemeClr val="accent1"/>
-          </a:effectRef>
-          <a:fontRef idx="minor">
-            <a:schemeClr val="lt1"/>
-          </a:fontRef>
-        </p:style>
-        <p:txBody>
-          <a:bodyPr rtlCol="0" anchor="ctr"/>
-          <a:lstStyle/>
-          <a:p>
-            <a:pPr algn="ctr"/>
             <a:endParaRPr lang="en-US" dirty="0"/>
           </a:p>
         </p:txBody>
@@ -22528,6 +22457,133 @@
           </a:p>
         </p:txBody>
       </p:sp>
+      <p:pic>
+        <p:nvPicPr>
+          <p:cNvPr id="11" name="Picture 10">
+            <a:extLst>
+              <a:ext uri="{FF2B5EF4-FFF2-40B4-BE49-F238E27FC236}">
+                <a16:creationId xmlns:a16="http://schemas.microsoft.com/office/drawing/2014/main" id="{4B66B39F-E881-4073-8C51-A95AC62B267C}"/>
+              </a:ext>
+            </a:extLst>
+          </p:cNvPr>
+          <p:cNvPicPr>
+            <a:picLocks noChangeAspect="1"/>
+          </p:cNvPicPr>
+          <p:nvPr/>
+        </p:nvPicPr>
+        <p:blipFill>
+          <a:blip r:embed="rId2"/>
+          <a:stretch>
+            <a:fillRect/>
+          </a:stretch>
+        </p:blipFill>
+        <p:spPr>
+          <a:xfrm>
+            <a:off x="1486245" y="1516281"/>
+            <a:ext cx="4457004" cy="2695848"/>
+          </a:xfrm>
+          <a:prstGeom prst="rect">
+            <a:avLst/>
+          </a:prstGeom>
+        </p:spPr>
+      </p:pic>
+      <p:grpSp>
+        <p:nvGrpSpPr>
+          <p:cNvPr id="13" name="Group 12">
+            <a:extLst>
+              <a:ext uri="{FF2B5EF4-FFF2-40B4-BE49-F238E27FC236}">
+                <a16:creationId xmlns:a16="http://schemas.microsoft.com/office/drawing/2014/main" id="{6FAFFDCB-9999-4BAF-928E-CE487F5084E8}"/>
+              </a:ext>
+            </a:extLst>
+          </p:cNvPr>
+          <p:cNvGrpSpPr/>
+          <p:nvPr/>
+        </p:nvGrpSpPr>
+        <p:grpSpPr>
+          <a:xfrm>
+            <a:off x="6421961" y="1516281"/>
+            <a:ext cx="4457004" cy="2695848"/>
+            <a:chOff x="6421961" y="1516281"/>
+            <a:chExt cx="4457004" cy="2695848"/>
+          </a:xfrm>
+        </p:grpSpPr>
+        <p:pic>
+          <p:nvPicPr>
+            <p:cNvPr id="12" name="Picture 11">
+              <a:extLst>
+                <a:ext uri="{FF2B5EF4-FFF2-40B4-BE49-F238E27FC236}">
+                  <a16:creationId xmlns:a16="http://schemas.microsoft.com/office/drawing/2014/main" id="{458AA2DC-8499-4783-97A0-13D4BA8E59FD}"/>
+                </a:ext>
+              </a:extLst>
+            </p:cNvPr>
+            <p:cNvPicPr>
+              <a:picLocks noChangeAspect="1"/>
+            </p:cNvPicPr>
+            <p:nvPr/>
+          </p:nvPicPr>
+          <p:blipFill>
+            <a:blip r:embed="rId3"/>
+            <a:stretch>
+              <a:fillRect/>
+            </a:stretch>
+          </p:blipFill>
+          <p:spPr>
+            <a:xfrm>
+              <a:off x="6421961" y="1516281"/>
+              <a:ext cx="4457004" cy="2695848"/>
+            </a:xfrm>
+            <a:prstGeom prst="rect">
+              <a:avLst/>
+            </a:prstGeom>
+          </p:spPr>
+        </p:pic>
+        <p:sp>
+          <p:nvSpPr>
+            <p:cNvPr id="7" name="Rectangle 6"/>
+            <p:cNvSpPr/>
+            <p:nvPr/>
+          </p:nvSpPr>
+          <p:spPr>
+            <a:xfrm>
+              <a:off x="6643615" y="3186819"/>
+              <a:ext cx="1820562" cy="115330"/>
+            </a:xfrm>
+            <a:prstGeom prst="rect">
+              <a:avLst/>
+            </a:prstGeom>
+            <a:noFill/>
+            <a:ln>
+              <a:solidFill>
+                <a:srgbClr val="FF0000"/>
+              </a:solidFill>
+            </a:ln>
+          </p:spPr>
+          <p:style>
+            <a:lnRef idx="2">
+              <a:schemeClr val="accent1">
+                <a:shade val="50000"/>
+              </a:schemeClr>
+            </a:lnRef>
+            <a:fillRef idx="1">
+              <a:schemeClr val="accent1"/>
+            </a:fillRef>
+            <a:effectRef idx="0">
+              <a:schemeClr val="accent1"/>
+            </a:effectRef>
+            <a:fontRef idx="minor">
+              <a:schemeClr val="lt1"/>
+            </a:fontRef>
+          </p:style>
+          <p:txBody>
+            <a:bodyPr rtlCol="0" anchor="ctr"/>
+            <a:lstStyle/>
+            <a:p>
+              <a:pPr algn="ctr"/>
+              <a:endParaRPr lang="en-US" dirty="0"/>
+            </a:p>
+          </p:txBody>
+        </p:sp>
+      </p:grpSp>
     </p:spTree>
     <p:extLst>
       <p:ext uri="{BB962C8B-B14F-4D97-AF65-F5344CB8AC3E}">
@@ -22590,7 +22646,12 @@
             <p:ph idx="1"/>
           </p:nvPr>
         </p:nvSpPr>
-        <p:spPr/>
+        <p:spPr>
+          <a:xfrm>
+            <a:off x="1219200" y="973669"/>
+            <a:ext cx="10363200" cy="4678363"/>
+          </a:xfrm>
+        </p:spPr>
         <p:txBody>
           <a:bodyPr/>
           <a:lstStyle/>
@@ -22625,29 +22686,108 @@
           </a:p>
         </p:txBody>
       </p:sp>
-      <p:pic>
-        <p:nvPicPr>
-          <p:cNvPr id="5" name="Picture 4"/>
-          <p:cNvPicPr>
-            <a:picLocks noChangeAspect="1"/>
-          </p:cNvPicPr>
+      <p:grpSp>
+        <p:nvGrpSpPr>
+          <p:cNvPr id="8" name="Group 7">
+            <a:extLst>
+              <a:ext uri="{FF2B5EF4-FFF2-40B4-BE49-F238E27FC236}">
+                <a16:creationId xmlns:a16="http://schemas.microsoft.com/office/drawing/2014/main" id="{F9AE967F-BE60-4446-9281-1F94A56F11CC}"/>
+              </a:ext>
+            </a:extLst>
+          </p:cNvPr>
+          <p:cNvGrpSpPr/>
           <p:nvPr/>
-        </p:nvPicPr>
-        <p:blipFill rotWithShape="1">
-          <a:blip r:embed="rId2"/>
-          <a:srcRect t="61793" r="92900"/>
-          <a:stretch/>
-        </p:blipFill>
-        <p:spPr>
+        </p:nvGrpSpPr>
+        <p:grpSpPr>
           <a:xfrm>
-            <a:off x="4685232" y="2116474"/>
-            <a:ext cx="2980164" cy="4510035"/>
+            <a:off x="4038600" y="1744133"/>
+            <a:ext cx="2692401" cy="4356100"/>
+            <a:chOff x="4038600" y="1744133"/>
+            <a:chExt cx="2692401" cy="4356100"/>
           </a:xfrm>
-          <a:prstGeom prst="rect">
-            <a:avLst/>
-          </a:prstGeom>
-        </p:spPr>
-      </p:pic>
+        </p:grpSpPr>
+        <p:pic>
+          <p:nvPicPr>
+            <p:cNvPr id="6" name="Picture 5">
+              <a:extLst>
+                <a:ext uri="{FF2B5EF4-FFF2-40B4-BE49-F238E27FC236}">
+                  <a16:creationId xmlns:a16="http://schemas.microsoft.com/office/drawing/2014/main" id="{BF97775B-1BF4-4EA9-AC70-863DA4EF5612}"/>
+                </a:ext>
+              </a:extLst>
+            </p:cNvPr>
+            <p:cNvPicPr>
+              <a:picLocks noChangeAspect="1"/>
+            </p:cNvPicPr>
+            <p:nvPr/>
+          </p:nvPicPr>
+          <p:blipFill rotWithShape="1">
+            <a:blip r:embed="rId2"/>
+            <a:srcRect t="32745" r="63946"/>
+            <a:stretch/>
+          </p:blipFill>
+          <p:spPr>
+            <a:xfrm>
+              <a:off x="4038600" y="1744133"/>
+              <a:ext cx="2692400" cy="4356100"/>
+            </a:xfrm>
+            <a:prstGeom prst="rect">
+              <a:avLst/>
+            </a:prstGeom>
+          </p:spPr>
+        </p:pic>
+        <p:sp>
+          <p:nvSpPr>
+            <p:cNvPr id="7" name="Rectangle 6">
+              <a:extLst>
+                <a:ext uri="{FF2B5EF4-FFF2-40B4-BE49-F238E27FC236}">
+                  <a16:creationId xmlns:a16="http://schemas.microsoft.com/office/drawing/2014/main" id="{FA46A244-C826-4591-BEF4-A56AE01443A5}"/>
+                </a:ext>
+              </a:extLst>
+            </p:cNvPr>
+            <p:cNvSpPr/>
+            <p:nvPr/>
+          </p:nvSpPr>
+          <p:spPr>
+            <a:xfrm>
+              <a:off x="4038601" y="3428999"/>
+              <a:ext cx="2692400" cy="423333"/>
+            </a:xfrm>
+            <a:prstGeom prst="rect">
+              <a:avLst/>
+            </a:prstGeom>
+            <a:noFill/>
+            <a:ln w="38100">
+              <a:solidFill>
+                <a:srgbClr val="FF0000"/>
+              </a:solidFill>
+            </a:ln>
+          </p:spPr>
+          <p:style>
+            <a:lnRef idx="2">
+              <a:schemeClr val="accent1">
+                <a:shade val="50000"/>
+              </a:schemeClr>
+            </a:lnRef>
+            <a:fillRef idx="1">
+              <a:schemeClr val="accent1"/>
+            </a:fillRef>
+            <a:effectRef idx="0">
+              <a:schemeClr val="accent1"/>
+            </a:effectRef>
+            <a:fontRef idx="minor">
+              <a:schemeClr val="lt1"/>
+            </a:fontRef>
+          </p:style>
+          <p:txBody>
+            <a:bodyPr rtlCol="0" anchor="ctr"/>
+            <a:lstStyle/>
+            <a:p>
+              <a:pPr algn="ctr"/>
+              <a:endParaRPr lang="en-US" dirty="0"/>
+            </a:p>
+          </p:txBody>
+        </p:sp>
+      </p:grpSp>
     </p:spTree>
     <p:extLst>
       <p:ext uri="{BB962C8B-B14F-4D97-AF65-F5344CB8AC3E}">
@@ -22722,14 +22862,25 @@
           <a:p>
             <a:r>
               <a:rPr lang="en-US" dirty="0"/>
-              <a:t>Change directory to the git-tutorial folder</a:t>
+              <a:t>Change directory to the </a:t>
+            </a:r>
+            <a:r>
+              <a:rPr lang="en-US" dirty="0" err="1">
+                <a:latin typeface="Courier New" panose="02070309020205020404" pitchFamily="49" charset="0"/>
+                <a:cs typeface="Courier New" panose="02070309020205020404" pitchFamily="49" charset="0"/>
+              </a:rPr>
+              <a:t>git_tutorial</a:t>
+            </a:r>
+            <a:r>
+              <a:rPr lang="en-US" dirty="0"/>
+              <a:t> folder</a:t>
             </a:r>
           </a:p>
           <a:p>
             <a:pPr lvl="1"/>
             <a:r>
               <a:rPr lang="en-US" dirty="0"/>
-              <a:t>Type drive letter corresponding to the location of the </a:t>
+              <a:t> Type drive letter corresponding to the location of the </a:t>
             </a:r>
             <a:r>
               <a:rPr lang="en-US" dirty="0">
@@ -22754,7 +22905,7 @@
             <a:pPr lvl="1"/>
             <a:r>
               <a:rPr lang="en-US" dirty="0"/>
-              <a:t>Copy file path for </a:t>
+              <a:t> Copy </a:t>
             </a:r>
             <a:r>
               <a:rPr lang="en-US" dirty="0">
@@ -22765,7 +22916,7 @@
             </a:r>
             <a:r>
               <a:rPr lang="en-US" dirty="0"/>
-              <a:t>  from Windows Explorer, </a:t>
+              <a:t> file path from Windows Explorer: </a:t>
             </a:r>
             <a:r>
               <a:rPr lang="en-US" dirty="0">
@@ -23006,7 +23157,7 @@
         <p:spPr>
           <a:xfrm>
             <a:off x="7648074" y="1856234"/>
-            <a:ext cx="4166205" cy="461665"/>
+            <a:ext cx="4235134" cy="461665"/>
           </a:xfrm>
           <a:prstGeom prst="rect">
             <a:avLst/>
@@ -23026,7 +23177,7 @@
                 </a:solidFill>
                 <a:latin typeface="+mn-lt"/>
               </a:rPr>
-              <a:t>Your drive will most likely be c:</a:t>
+              <a:t>Your drive will most likely be C:</a:t>
             </a:r>
           </a:p>
         </p:txBody>
@@ -24222,7 +24373,7 @@
             </a:pPr>
             <a:r>
               <a:rPr lang="en-US" dirty="0"/>
-              <a:t>You’ll need to perform a </a:t>
+              <a:t>A </a:t>
             </a:r>
             <a:r>
               <a:rPr lang="en-US" dirty="0">
@@ -24233,7 +24384,7 @@
             </a:r>
             <a:r>
               <a:rPr lang="en-US" dirty="0"/>
-              <a:t>command each time you want to commit changes to a file</a:t>
+              <a:t>command is required on the command line each time you want to commit changes to a file</a:t>
             </a:r>
           </a:p>
         </p:txBody>
@@ -24946,7 +25097,7 @@
                 <a:latin typeface="Courier New" panose="02070309020205020404" pitchFamily="49" charset="0"/>
                 <a:cs typeface="Courier New" panose="02070309020205020404" pitchFamily="49" charset="0"/>
               </a:rPr>
-              <a:t>Return</a:t>
+              <a:t>Enter </a:t>
             </a:r>
           </a:p>
           <a:p>
@@ -24971,7 +25122,7 @@
                 <a:latin typeface="Courier New" panose="02070309020205020404" pitchFamily="49" charset="0"/>
                 <a:cs typeface="Courier New" panose="02070309020205020404" pitchFamily="49" charset="0"/>
               </a:rPr>
-              <a:t>Return</a:t>
+              <a:t>Enter</a:t>
             </a:r>
             <a:endParaRPr lang="en-US" dirty="0"/>
           </a:p>
@@ -25177,30 +25328,111 @@
           </a:p>
         </p:txBody>
       </p:sp>
-      <p:pic>
-        <p:nvPicPr>
-          <p:cNvPr id="5" name="Picture 4"/>
-          <p:cNvPicPr>
-            <a:picLocks noChangeAspect="1"/>
-          </p:cNvPicPr>
+      <p:grpSp>
+        <p:nvGrpSpPr>
+          <p:cNvPr id="6" name="Group 5">
+            <a:extLst>
+              <a:ext uri="{FF2B5EF4-FFF2-40B4-BE49-F238E27FC236}">
+                <a16:creationId xmlns:a16="http://schemas.microsoft.com/office/drawing/2014/main" id="{E5310457-24C7-493F-9628-AA759BE9487A}"/>
+              </a:ext>
+            </a:extLst>
+          </p:cNvPr>
+          <p:cNvGrpSpPr>
+            <a:grpSpLocks noChangeAspect="1"/>
+          </p:cNvGrpSpPr>
           <p:nvPr/>
-        </p:nvPicPr>
-        <p:blipFill>
-          <a:blip r:embed="rId2"/>
-          <a:stretch>
-            <a:fillRect/>
-          </a:stretch>
-        </p:blipFill>
-        <p:spPr>
+        </p:nvGrpSpPr>
+        <p:grpSpPr>
           <a:xfrm>
-            <a:off x="2156910" y="1779671"/>
-            <a:ext cx="8239125" cy="4838700"/>
+            <a:off x="2815862" y="1795680"/>
+            <a:ext cx="7657404" cy="4631631"/>
+            <a:chOff x="6421961" y="1516281"/>
+            <a:chExt cx="4457004" cy="2695848"/>
           </a:xfrm>
-          <a:prstGeom prst="rect">
-            <a:avLst/>
-          </a:prstGeom>
-        </p:spPr>
-      </p:pic>
+        </p:grpSpPr>
+        <p:pic>
+          <p:nvPicPr>
+            <p:cNvPr id="7" name="Picture 6">
+              <a:extLst>
+                <a:ext uri="{FF2B5EF4-FFF2-40B4-BE49-F238E27FC236}">
+                  <a16:creationId xmlns:a16="http://schemas.microsoft.com/office/drawing/2014/main" id="{BD6D362F-9949-43C0-9A6A-5E12F22BE984}"/>
+                </a:ext>
+              </a:extLst>
+            </p:cNvPr>
+            <p:cNvPicPr>
+              <a:picLocks noChangeAspect="1"/>
+            </p:cNvPicPr>
+            <p:nvPr/>
+          </p:nvPicPr>
+          <p:blipFill>
+            <a:blip r:embed="rId2"/>
+            <a:stretch>
+              <a:fillRect/>
+            </a:stretch>
+          </p:blipFill>
+          <p:spPr>
+            <a:xfrm>
+              <a:off x="6421961" y="1516281"/>
+              <a:ext cx="4457004" cy="2695848"/>
+            </a:xfrm>
+            <a:prstGeom prst="rect">
+              <a:avLst/>
+            </a:prstGeom>
+          </p:spPr>
+        </p:pic>
+        <p:sp>
+          <p:nvSpPr>
+            <p:cNvPr id="8" name="Rectangle 7">
+              <a:extLst>
+                <a:ext uri="{FF2B5EF4-FFF2-40B4-BE49-F238E27FC236}">
+                  <a16:creationId xmlns:a16="http://schemas.microsoft.com/office/drawing/2014/main" id="{1AFCD697-F3BD-41C4-8AC6-E8EC1718CEC3}"/>
+                </a:ext>
+              </a:extLst>
+            </p:cNvPr>
+            <p:cNvSpPr/>
+            <p:nvPr/>
+          </p:nvSpPr>
+          <p:spPr>
+            <a:xfrm>
+              <a:off x="6643615" y="3186819"/>
+              <a:ext cx="1820562" cy="115330"/>
+            </a:xfrm>
+            <a:prstGeom prst="rect">
+              <a:avLst/>
+            </a:prstGeom>
+            <a:noFill/>
+            <a:ln>
+              <a:solidFill>
+                <a:srgbClr val="FF0000"/>
+              </a:solidFill>
+            </a:ln>
+          </p:spPr>
+          <p:style>
+            <a:lnRef idx="2">
+              <a:schemeClr val="accent1">
+                <a:shade val="50000"/>
+              </a:schemeClr>
+            </a:lnRef>
+            <a:fillRef idx="1">
+              <a:schemeClr val="accent1"/>
+            </a:fillRef>
+            <a:effectRef idx="0">
+              <a:schemeClr val="accent1"/>
+            </a:effectRef>
+            <a:fontRef idx="minor">
+              <a:schemeClr val="lt1"/>
+            </a:fontRef>
+          </p:style>
+          <p:txBody>
+            <a:bodyPr rtlCol="0" anchor="ctr"/>
+            <a:lstStyle/>
+            <a:p>
+              <a:pPr algn="ctr"/>
+              <a:endParaRPr lang="en-US" dirty="0"/>
+            </a:p>
+          </p:txBody>
+        </p:sp>
+      </p:grpSp>
     </p:spTree>
     <p:extLst>
       <p:ext uri="{BB962C8B-B14F-4D97-AF65-F5344CB8AC3E}">
@@ -25302,7 +25534,7 @@
             </a:pPr>
             <a:r>
               <a:rPr lang="en-US" dirty="0"/>
-              <a:t>… so the working code in </a:t>
+              <a:t> Working code in </a:t>
             </a:r>
             <a:r>
               <a:rPr lang="en-US" dirty="0">
@@ -25324,7 +25556,7 @@
             </a:pPr>
             <a:r>
               <a:rPr lang="en-US" dirty="0"/>
-              <a:t>… make sure revisions work in </a:t>
+              <a:t> Make sure revisions work in </a:t>
             </a:r>
             <a:r>
               <a:rPr lang="en-US" dirty="0">
@@ -25346,7 +25578,46 @@
             </a:pPr>
             <a:r>
               <a:rPr lang="en-US" dirty="0"/>
-              <a:t>… then merge back into the </a:t>
+              <a:t> Commit changes in </a:t>
+            </a:r>
+            <a:r>
+              <a:rPr lang="en-US" dirty="0">
+                <a:latin typeface="Courier New" panose="02070309020205020404" pitchFamily="49" charset="0"/>
+                <a:cs typeface="Courier New" panose="02070309020205020404" pitchFamily="49" charset="0"/>
+              </a:rPr>
+              <a:t>test</a:t>
+            </a:r>
+            <a:r>
+              <a:rPr lang="en-US" dirty="0"/>
+              <a:t> branch</a:t>
+            </a:r>
+          </a:p>
+          <a:p>
+            <a:pPr lvl="1">
+              <a:spcBef>
+                <a:spcPts val="0"/>
+              </a:spcBef>
+            </a:pPr>
+            <a:r>
+              <a:rPr lang="en-US" dirty="0"/>
+              <a:t> Then, merge</a:t>
+            </a:r>
+            <a:r>
+              <a:rPr lang="en-US" dirty="0">
+                <a:cs typeface="Courier New" panose="02070309020205020404" pitchFamily="49" charset="0"/>
+              </a:rPr>
+              <a:t> </a:t>
+            </a:r>
+            <a:r>
+              <a:rPr lang="en-US" dirty="0">
+                <a:latin typeface="Courier New" panose="02070309020205020404" pitchFamily="49" charset="0"/>
+                <a:cs typeface="Courier New" panose="02070309020205020404" pitchFamily="49" charset="0"/>
+              </a:rPr>
+              <a:t>test</a:t>
+            </a:r>
+            <a:r>
+              <a:rPr lang="en-US" dirty="0"/>
+              <a:t> branch back into the </a:t>
             </a:r>
             <a:r>
               <a:rPr lang="en-US" dirty="0">
@@ -25357,7 +25628,18 @@
             </a:r>
             <a:r>
               <a:rPr lang="en-US" dirty="0"/>
-              <a:t> branch when you want to finalize them</a:t>
+              <a:t> branch to incorporate them into the </a:t>
+            </a:r>
+            <a:r>
+              <a:rPr lang="en-US" dirty="0">
+                <a:latin typeface="Courier New" panose="02070309020205020404" pitchFamily="49" charset="0"/>
+                <a:cs typeface="Courier New" panose="02070309020205020404" pitchFamily="49" charset="0"/>
+              </a:rPr>
+              <a:t>master</a:t>
+            </a:r>
+            <a:r>
+              <a:rPr lang="en-US" dirty="0"/>
+              <a:t> branch </a:t>
             </a:r>
           </a:p>
         </p:txBody>
@@ -25502,7 +25784,7 @@
                 <a:latin typeface="Courier New" panose="02070309020205020404" pitchFamily="49" charset="0"/>
                 <a:cs typeface="Courier New" panose="02070309020205020404" pitchFamily="49" charset="0"/>
               </a:rPr>
-              <a:t>Return</a:t>
+              <a:t>Enter</a:t>
             </a:r>
           </a:p>
           <a:p>
@@ -25736,7 +26018,7 @@
                 <a:latin typeface="Courier New" panose="02070309020205020404" pitchFamily="49" charset="0"/>
                 <a:cs typeface="Courier New" panose="02070309020205020404" pitchFamily="49" charset="0"/>
               </a:rPr>
-              <a:t>Return</a:t>
+              <a:t>Enter</a:t>
             </a:r>
           </a:p>
           <a:p>
@@ -25840,29 +26122,6 @@
           </a:p>
         </p:txBody>
       </p:sp>
-      <p:pic>
-        <p:nvPicPr>
-          <p:cNvPr id="6" name="Picture 5"/>
-          <p:cNvPicPr>
-            <a:picLocks noChangeAspect="1"/>
-          </p:cNvPicPr>
-          <p:nvPr/>
-        </p:nvPicPr>
-        <p:blipFill rotWithShape="1">
-          <a:blip r:embed="rId3"/>
-          <a:srcRect t="19903" r="47491" b="13448"/>
-          <a:stretch/>
-        </p:blipFill>
-        <p:spPr>
-          <a:xfrm>
-            <a:off x="6964132" y="3496553"/>
-            <a:ext cx="4326203" cy="3224922"/>
-          </a:xfrm>
-          <a:prstGeom prst="rect">
-            <a:avLst/>
-          </a:prstGeom>
-        </p:spPr>
-      </p:pic>
       <p:sp>
         <p:nvSpPr>
           <p:cNvPr id="7" name="TextBox 6"/>
@@ -25924,6 +26183,35 @@
           </a:p>
         </p:txBody>
       </p:sp>
+      <p:pic>
+        <p:nvPicPr>
+          <p:cNvPr id="10" name="Picture 9">
+            <a:extLst>
+              <a:ext uri="{FF2B5EF4-FFF2-40B4-BE49-F238E27FC236}">
+                <a16:creationId xmlns:a16="http://schemas.microsoft.com/office/drawing/2014/main" id="{2A4F6C91-465B-48E7-A037-B0529C9FA335}"/>
+              </a:ext>
+            </a:extLst>
+          </p:cNvPr>
+          <p:cNvPicPr>
+            <a:picLocks noChangeAspect="1"/>
+          </p:cNvPicPr>
+          <p:nvPr/>
+        </p:nvPicPr>
+        <p:blipFill rotWithShape="1">
+          <a:blip r:embed="rId3"/>
+          <a:srcRect r="36465" b="18371"/>
+          <a:stretch/>
+        </p:blipFill>
+        <p:spPr>
+          <a:xfrm>
+            <a:off x="6972645" y="3568409"/>
+            <a:ext cx="4057424" cy="3153066"/>
+          </a:xfrm>
+          <a:prstGeom prst="rect">
+            <a:avLst/>
+          </a:prstGeom>
+        </p:spPr>
+      </p:pic>
     </p:spTree>
     <p:extLst>
       <p:ext uri="{BB962C8B-B14F-4D97-AF65-F5344CB8AC3E}">
@@ -26046,7 +26334,7 @@
                 <a:latin typeface="Courier New" panose="02070309020205020404" pitchFamily="49" charset="0"/>
                 <a:cs typeface="Courier New" panose="02070309020205020404" pitchFamily="49" charset="0"/>
               </a:rPr>
-              <a:t>Return</a:t>
+              <a:t>Enter</a:t>
             </a:r>
             <a:endParaRPr lang="en-US" dirty="0"/>
           </a:p>
@@ -26298,7 +26586,13 @@
       </p:sp>
       <p:pic>
         <p:nvPicPr>
-          <p:cNvPr id="5" name="Picture 4"/>
+          <p:cNvPr id="7" name="Picture 6">
+            <a:extLst>
+              <a:ext uri="{FF2B5EF4-FFF2-40B4-BE49-F238E27FC236}">
+                <a16:creationId xmlns:a16="http://schemas.microsoft.com/office/drawing/2014/main" id="{09E8A2FC-89D0-4FAE-87E2-A921B01BFBF7}"/>
+              </a:ext>
+            </a:extLst>
+          </p:cNvPr>
           <p:cNvPicPr>
             <a:picLocks noChangeAspect="1"/>
           </p:cNvPicPr>
@@ -26312,8 +26606,8 @@
         </p:blipFill>
         <p:spPr>
           <a:xfrm>
-            <a:off x="2645923" y="2184095"/>
-            <a:ext cx="7726049" cy="4537379"/>
+            <a:off x="3053909" y="2343324"/>
+            <a:ext cx="7177745" cy="4341506"/>
           </a:xfrm>
           <a:prstGeom prst="rect">
             <a:avLst/>
@@ -26435,7 +26729,7 @@
                 <a:latin typeface="Courier New" panose="02070309020205020404" pitchFamily="49" charset="0"/>
                 <a:cs typeface="Courier New" panose="02070309020205020404" pitchFamily="49" charset="0"/>
               </a:rPr>
-              <a:t>Return</a:t>
+              <a:t>Enter</a:t>
             </a:r>
           </a:p>
           <a:p>
@@ -26460,7 +26754,7 @@
                 <a:latin typeface="Courier New" panose="02070309020205020404" pitchFamily="49" charset="0"/>
                 <a:cs typeface="Courier New" panose="02070309020205020404" pitchFamily="49" charset="0"/>
               </a:rPr>
-              <a:t>Return </a:t>
+              <a:t>Enter </a:t>
             </a:r>
             <a:r>
               <a:rPr lang="en-US" dirty="0">
@@ -26617,7 +26911,7 @@
             </a:pPr>
             <a:r>
               <a:rPr lang="en-US" dirty="0"/>
-              <a:t>Version control permits program development while avoiding breaking a program</a:t>
+              <a:t>Version control permits program development to safely continue without:</a:t>
             </a:r>
           </a:p>
           <a:p>
@@ -26628,7 +26922,29 @@
             </a:pPr>
             <a:r>
               <a:rPr lang="en-US" dirty="0"/>
-              <a:t>You can always revert to a previous functional copy</a:t>
+              <a:t> Breaking a program</a:t>
+            </a:r>
+          </a:p>
+          <a:p>
+            <a:pPr lvl="2">
+              <a:spcBef>
+                <a:spcPts val="300"/>
+              </a:spcBef>
+            </a:pPr>
+            <a:r>
+              <a:rPr lang="en-US" dirty="0"/>
+              <a:t> You can always revert to a previous functional copy</a:t>
+            </a:r>
+          </a:p>
+          <a:p>
+            <a:pPr lvl="1">
+              <a:spcBef>
+                <a:spcPts val="300"/>
+              </a:spcBef>
+            </a:pPr>
+            <a:r>
+              <a:rPr lang="en-US" dirty="0"/>
+              <a:t> Having multiple “versions” saved</a:t>
             </a:r>
           </a:p>
           <a:p>
@@ -26650,47 +26966,7 @@
             </a:pPr>
             <a:r>
               <a:rPr lang="en-US" dirty="0"/>
-              <a:t>For a sole developer:</a:t>
-            </a:r>
-          </a:p>
-          <a:p>
-            <a:pPr lvl="2">
-              <a:spcBef>
-                <a:spcPts val="300"/>
-              </a:spcBef>
-            </a:pPr>
-            <a:r>
-              <a:rPr lang="en-US" dirty="0"/>
-              <a:t>Install git on your computer</a:t>
-            </a:r>
-          </a:p>
-          <a:p>
-            <a:pPr lvl="1">
-              <a:spcBef>
-                <a:spcPts val="300"/>
-              </a:spcBef>
-            </a:pPr>
-            <a:r>
-              <a:rPr lang="en-US" dirty="0"/>
-              <a:t>For collaboration</a:t>
-            </a:r>
-          </a:p>
-          <a:p>
-            <a:pPr lvl="2">
-              <a:spcBef>
-                <a:spcPts val="300"/>
-              </a:spcBef>
-            </a:pPr>
-            <a:r>
-              <a:rPr lang="en-US" dirty="0"/>
-              <a:t>Use desktop git with </a:t>
-            </a:r>
-            <a:r>
-              <a:rPr lang="en-US" dirty="0">
-                <a:latin typeface="Courier New" panose="02070309020205020404" pitchFamily="49" charset="0"/>
-                <a:cs typeface="Courier New" panose="02070309020205020404" pitchFamily="49" charset="0"/>
-              </a:rPr>
-              <a:t>github.com</a:t>
+              <a:t>For sole developers or for collaboration</a:t>
             </a:r>
           </a:p>
         </p:txBody>
@@ -26817,7 +27093,7 @@
                 <a:latin typeface="Courier New" panose="02070309020205020404" pitchFamily="49" charset="0"/>
                 <a:cs typeface="Courier New" panose="02070309020205020404" pitchFamily="49" charset="0"/>
               </a:rPr>
-              <a:t>Return</a:t>
+              <a:t>Enter</a:t>
             </a:r>
             <a:r>
               <a:rPr lang="en-US" dirty="0"/>
@@ -27267,7 +27543,13 @@
       </p:sp>
       <p:pic>
         <p:nvPicPr>
-          <p:cNvPr id="5" name="Picture 4"/>
+          <p:cNvPr id="6" name="Picture 5">
+            <a:extLst>
+              <a:ext uri="{FF2B5EF4-FFF2-40B4-BE49-F238E27FC236}">
+                <a16:creationId xmlns:a16="http://schemas.microsoft.com/office/drawing/2014/main" id="{A735710D-167C-41BF-AF3C-1ABEF9029C8C}"/>
+              </a:ext>
+            </a:extLst>
+          </p:cNvPr>
           <p:cNvPicPr>
             <a:picLocks noChangeAspect="1"/>
           </p:cNvPicPr>
@@ -27281,8 +27563,8 @@
         </p:blipFill>
         <p:spPr>
           <a:xfrm>
-            <a:off x="2314222" y="2035289"/>
-            <a:ext cx="7573962" cy="4448061"/>
+            <a:off x="2602774" y="2137819"/>
+            <a:ext cx="7349747" cy="4445543"/>
           </a:xfrm>
           <a:prstGeom prst="rect">
             <a:avLst/>
@@ -27358,7 +27640,7 @@
           <a:p>
             <a:r>
               <a:rPr lang="en-US" dirty="0"/>
-              <a:t>Install desktop git</a:t>
+              <a:t>Install command line git</a:t>
             </a:r>
           </a:p>
           <a:p>
@@ -27367,11 +27649,24 @@
               <a:rPr lang="en-US" dirty="0">
                 <a:hlinkClick r:id="rId2"/>
               </a:rPr>
-              <a:t>https://desktop.github.com/</a:t>
+              <a:t>https://git-scm.com/download/win</a:t>
             </a:r>
             <a:r>
               <a:rPr lang="en-US" dirty="0"/>
               <a:t> </a:t>
+            </a:r>
+          </a:p>
+          <a:p>
+            <a:r>
+              <a:rPr lang="en-US" dirty="0">
+                <a:latin typeface="Courier New" panose="02070309020205020404" pitchFamily="49" charset="0"/>
+                <a:cs typeface="Courier New" panose="02070309020205020404" pitchFamily="49" charset="0"/>
+              </a:rPr>
+              <a:t>udacity.com</a:t>
+            </a:r>
+            <a:r>
+              <a:rPr lang="en-US" dirty="0"/>
+              <a:t> course</a:t>
             </a:r>
           </a:p>
           <a:p>
@@ -27380,7 +27675,7 @@
               <a:rPr lang="en-US" dirty="0">
                 <a:hlinkClick r:id="rId3"/>
               </a:rPr>
-              <a:t>https://git-scm.com/download/win</a:t>
+              <a:t>https://in.udacity.com/course/how-to-use-git-and-github--ud775/</a:t>
             </a:r>
             <a:r>
               <a:rPr lang="en-US" dirty="0"/>
@@ -27390,7 +27685,7 @@
           <a:p>
             <a:r>
               <a:rPr lang="en-US" dirty="0"/>
-              <a:t>udacity.com course</a:t>
+              <a:t>Online interactive tutorial</a:t>
             </a:r>
           </a:p>
           <a:p>
@@ -27398,25 +27693,6 @@
             <a:r>
               <a:rPr lang="en-US" dirty="0">
                 <a:hlinkClick r:id="rId4"/>
-              </a:rPr>
-              <a:t>https://in.udacity.com/course/how-to-use-git-and-github--ud775/</a:t>
-            </a:r>
-            <a:r>
-              <a:rPr lang="en-US" dirty="0"/>
-              <a:t> </a:t>
-            </a:r>
-          </a:p>
-          <a:p>
-            <a:r>
-              <a:rPr lang="en-US" dirty="0"/>
-              <a:t>Online interactive tutorial</a:t>
-            </a:r>
-          </a:p>
-          <a:p>
-            <a:pPr lvl="1"/>
-            <a:r>
-              <a:rPr lang="en-US" dirty="0">
-                <a:hlinkClick r:id="rId5"/>
               </a:rPr>
               <a:t>https://try.github.io/levels/1/challenges/1</a:t>
             </a:r>
@@ -27926,18 +28202,30 @@
         </p:nvSpPr>
         <p:spPr>
           <a:xfrm>
-            <a:off x="1219200" y="1219200"/>
-            <a:ext cx="10363200" cy="4906963"/>
+            <a:off x="1219200" y="1001028"/>
+            <a:ext cx="10363200" cy="5125136"/>
           </a:xfrm>
         </p:spPr>
         <p:txBody>
           <a:bodyPr/>
           <a:lstStyle/>
           <a:p>
+            <a:pPr>
+              <a:spcBef>
+                <a:spcPts val="0"/>
+              </a:spcBef>
+            </a:pPr>
             <a:r>
               <a:rPr lang="en-US" dirty="0"/>
-              <a:t> </a:t>
-            </a:r>
+              <a:t> Install GitHub Desktop App</a:t>
+            </a:r>
+          </a:p>
+          <a:p>
+            <a:pPr lvl="1">
+              <a:spcBef>
+                <a:spcPts val="0"/>
+              </a:spcBef>
+            </a:pPr>
             <a:r>
               <a:rPr lang="en-US" dirty="0">
                 <a:hlinkClick r:id="rId2"/>
@@ -28002,8 +28290,8 @@
         </p:blipFill>
         <p:spPr>
           <a:xfrm>
-            <a:off x="2153434" y="1927843"/>
-            <a:ext cx="8140169" cy="4555507"/>
+            <a:off x="2170294" y="2165968"/>
+            <a:ext cx="7531971" cy="4215139"/>
           </a:xfrm>
           <a:prstGeom prst="rect">
             <a:avLst/>
@@ -28084,7 +28372,12 @@
             <p:ph idx="1"/>
           </p:nvPr>
         </p:nvSpPr>
-        <p:spPr/>
+        <p:spPr>
+          <a:xfrm>
+            <a:off x="1219199" y="1447800"/>
+            <a:ext cx="10523621" cy="4678363"/>
+          </a:xfrm>
+        </p:spPr>
         <p:txBody>
           <a:bodyPr/>
           <a:lstStyle/>
@@ -28095,9 +28388,59 @@
             </a:r>
           </a:p>
           <a:p>
+            <a:pPr lvl="1"/>
             <a:r>
               <a:rPr lang="en-US" dirty="0"/>
-              <a:t>Publishes repo to </a:t>
+              <a:t> GUI</a:t>
+            </a:r>
+          </a:p>
+          <a:p>
+            <a:r>
+              <a:rPr lang="en-US" dirty="0"/>
+              <a:t> Some differences from command line git</a:t>
+            </a:r>
+          </a:p>
+          <a:p>
+            <a:pPr lvl="1"/>
+            <a:r>
+              <a:rPr lang="en-US" dirty="0"/>
+              <a:t> </a:t>
+            </a:r>
+            <a:r>
+              <a:rPr lang="en-US" dirty="0">
+                <a:latin typeface="Courier New" panose="02070309020205020404" pitchFamily="49" charset="0"/>
+                <a:cs typeface="Courier New" panose="02070309020205020404" pitchFamily="49" charset="0"/>
+              </a:rPr>
+              <a:t>git add</a:t>
+            </a:r>
+            <a:r>
+              <a:rPr lang="en-US" dirty="0"/>
+              <a:t> is implicit </a:t>
+            </a:r>
+            <a:endParaRPr lang="en-US" dirty="0">
+              <a:latin typeface="Courier New" panose="02070309020205020404" pitchFamily="49" charset="0"/>
+              <a:cs typeface="Courier New" panose="02070309020205020404" pitchFamily="49" charset="0"/>
+            </a:endParaRPr>
+          </a:p>
+          <a:p>
+            <a:pPr lvl="1"/>
+            <a:r>
+              <a:rPr lang="en-US" dirty="0"/>
+              <a:t> Publishes repo to </a:t>
+            </a:r>
+            <a:r>
+              <a:rPr lang="en-US" dirty="0">
+                <a:latin typeface="Courier New" panose="02070309020205020404" pitchFamily="49" charset="0"/>
+                <a:cs typeface="Courier New" panose="02070309020205020404" pitchFamily="49" charset="0"/>
+              </a:rPr>
+              <a:t>github.com</a:t>
+            </a:r>
+          </a:p>
+          <a:p>
+            <a:pPr lvl="1"/>
+            <a:r>
+              <a:rPr lang="en-US" dirty="0"/>
+              <a:t> Clones repo from </a:t>
             </a:r>
             <a:r>
               <a:rPr lang="en-US" dirty="0">
@@ -28246,6 +28589,28 @@
             </a:r>
           </a:p>
           <a:p>
+            <a:pPr lvl="1">
+              <a:spcBef>
+                <a:spcPts val="0"/>
+              </a:spcBef>
+            </a:pPr>
+            <a:r>
+              <a:rPr lang="en-US" dirty="0"/>
+              <a:t> Discussed, debugged… </a:t>
+            </a:r>
+          </a:p>
+          <a:p>
+            <a:pPr lvl="1">
+              <a:spcBef>
+                <a:spcPts val="0"/>
+              </a:spcBef>
+            </a:pPr>
+            <a:r>
+              <a:rPr lang="en-US" dirty="0"/>
+              <a:t> Then merged back into the master branch</a:t>
+            </a:r>
+          </a:p>
+          <a:p>
             <a:pPr>
               <a:spcBef>
                 <a:spcPts val="0"/>
@@ -28253,18 +28618,7 @@
             </a:pPr>
             <a:r>
               <a:rPr lang="en-US" dirty="0"/>
-              <a:t>Discussed, debugged, then merged back into the master branch</a:t>
-            </a:r>
-          </a:p>
-          <a:p>
-            <a:pPr>
-              <a:spcBef>
-                <a:spcPts val="0"/>
-              </a:spcBef>
-            </a:pPr>
-            <a:r>
-              <a:rPr lang="en-US" dirty="0"/>
-              <a:t>Master branch code is never disrupted</a:t>
+              <a:t>Master branch code is never disturbed</a:t>
             </a:r>
           </a:p>
         </p:txBody>
@@ -31038,19 +31392,6 @@
               <a:t>… and Github as a portfolio repository</a:t>
             </a:r>
           </a:p>
-          <a:p>
-            <a:r>
-              <a:rPr lang="en-US" dirty="0"/>
-              <a:t>Relatively small step from there to collaboration </a:t>
-            </a:r>
-          </a:p>
-          <a:p>
-            <a:pPr lvl="1"/>
-            <a:r>
-              <a:rPr lang="en-US" dirty="0"/>
-              <a:t>Extra session later for this, time permitting</a:t>
-            </a:r>
-          </a:p>
         </p:txBody>
       </p:sp>
       <p:sp>
@@ -31269,7 +31610,7 @@
             </a:pPr>
             <a:r>
               <a:rPr lang="en-US" dirty="0"/>
-              <a:t> We’ll step through a basic sequence of git commands</a:t>
+              <a:t> We’ll step through basic command line git commands</a:t>
             </a:r>
           </a:p>
           <a:p>
@@ -31395,27 +31736,41 @@
         </p:nvSpPr>
         <p:spPr>
           <a:xfrm>
-            <a:off x="1219199" y="1447800"/>
-            <a:ext cx="10742141" cy="4678363"/>
+            <a:off x="1219199" y="1092200"/>
+            <a:ext cx="10742141" cy="5033963"/>
           </a:xfrm>
         </p:spPr>
         <p:txBody>
           <a:bodyPr/>
           <a:lstStyle/>
           <a:p>
+            <a:pPr>
+              <a:spcBef>
+                <a:spcPts val="200"/>
+              </a:spcBef>
+            </a:pPr>
             <a:r>
               <a:rPr lang="en-US" dirty="0"/>
               <a:t>Conceptually what’s happening…</a:t>
             </a:r>
           </a:p>
           <a:p>
+            <a:pPr>
+              <a:spcBef>
+                <a:spcPts val="200"/>
+              </a:spcBef>
+            </a:pPr>
             <a:r>
               <a:rPr lang="en-US" dirty="0"/>
               <a:t>We’ll be working on a Python program: </a:t>
             </a:r>
           </a:p>
           <a:p>
-            <a:pPr lvl="1"/>
+            <a:pPr lvl="1">
+              <a:spcBef>
+                <a:spcPts val="200"/>
+              </a:spcBef>
+            </a:pPr>
             <a:r>
               <a:rPr lang="en-US" dirty="0">
                 <a:latin typeface="Courier New" panose="02070309020205020404" pitchFamily="49" charset="0"/>
@@ -31427,17 +31782,26 @@
               <a:rPr lang="en-US" dirty="0">
                 <a:cs typeface="Courier New" panose="02070309020205020404" pitchFamily="49" charset="0"/>
               </a:rPr>
-              <a:t> in a folder called </a:t>
-            </a:r>
-            <a:r>
-              <a:rPr lang="en-US" dirty="0">
+              <a:t> in the folder </a:t>
+            </a:r>
+            <a:r>
+              <a:rPr lang="en-US" dirty="0" err="1">
                 <a:latin typeface="Courier New" panose="02070309020205020404" pitchFamily="49" charset="0"/>
                 <a:cs typeface="Courier New" panose="02070309020205020404" pitchFamily="49" charset="0"/>
               </a:rPr>
               <a:t>git_tutorial</a:t>
             </a:r>
-          </a:p>
-          <a:p>
+            <a:endParaRPr lang="en-US" dirty="0">
+              <a:latin typeface="Courier New" panose="02070309020205020404" pitchFamily="49" charset="0"/>
+              <a:cs typeface="Courier New" panose="02070309020205020404" pitchFamily="49" charset="0"/>
+            </a:endParaRPr>
+          </a:p>
+          <a:p>
+            <a:pPr>
+              <a:spcBef>
+                <a:spcPts val="200"/>
+              </a:spcBef>
+            </a:pPr>
             <a:r>
               <a:rPr lang="en-US" dirty="0"/>
               <a:t>We’ll create a </a:t>
@@ -31466,7 +31830,11 @@
             </a:r>
           </a:p>
           <a:p>
-            <a:pPr lvl="1"/>
+            <a:pPr lvl="1">
+              <a:spcBef>
+                <a:spcPts val="200"/>
+              </a:spcBef>
+            </a:pPr>
             <a:r>
               <a:rPr lang="en-US" dirty="0"/>
               <a:t> The </a:t>
@@ -31484,7 +31852,11 @@
             </a:r>
           </a:p>
           <a:p>
-            <a:pPr lvl="1"/>
+            <a:pPr lvl="1">
+              <a:spcBef>
+                <a:spcPts val="200"/>
+              </a:spcBef>
+            </a:pPr>
             <a:r>
               <a:rPr lang="en-US" dirty="0"/>
               <a:t> We’ll make changes to the </a:t>
@@ -31502,6 +31874,11 @@
             </a:r>
           </a:p>
           <a:p>
+            <a:pPr>
+              <a:spcBef>
+                <a:spcPts val="200"/>
+              </a:spcBef>
+            </a:pPr>
             <a:r>
               <a:rPr lang="en-US" dirty="0"/>
               <a:t>Git keeps track of multiple versions </a:t>
@@ -31526,12 +31903,80 @@
             </a:r>
             <a:r>
               <a:rPr lang="en-US" dirty="0"/>
-              <a:t> by logging changes made in each version</a:t>
-            </a:r>
-            <a:endParaRPr lang="en-US" dirty="0">
-              <a:latin typeface="Courier New" panose="02070309020205020404" pitchFamily="49" charset="0"/>
-              <a:cs typeface="Courier New" panose="02070309020205020404" pitchFamily="49" charset="0"/>
-            </a:endParaRPr>
+              <a:t> </a:t>
+            </a:r>
+          </a:p>
+          <a:p>
+            <a:pPr lvl="1">
+              <a:spcBef>
+                <a:spcPts val="200"/>
+              </a:spcBef>
+            </a:pPr>
+            <a:r>
+              <a:rPr lang="en-US" dirty="0"/>
+              <a:t> Only one </a:t>
+            </a:r>
+            <a:r>
+              <a:rPr lang="en-US" dirty="0">
+                <a:latin typeface="Courier New" panose="02070309020205020404" pitchFamily="49" charset="0"/>
+                <a:cs typeface="Courier New" panose="02070309020205020404" pitchFamily="49" charset="0"/>
+              </a:rPr>
+              <a:t>my.py</a:t>
+            </a:r>
+            <a:r>
+              <a:rPr lang="en-US" dirty="0"/>
+              <a:t> will appear in </a:t>
+            </a:r>
+            <a:r>
+              <a:rPr lang="en-US" dirty="0" err="1">
+                <a:latin typeface="Courier New" panose="02070309020205020404" pitchFamily="49" charset="0"/>
+                <a:cs typeface="Courier New" panose="02070309020205020404" pitchFamily="49" charset="0"/>
+              </a:rPr>
+              <a:t>git_tutorial</a:t>
+            </a:r>
+            <a:r>
+              <a:rPr lang="en-US" dirty="0"/>
+              <a:t> at any one time</a:t>
+            </a:r>
+          </a:p>
+          <a:p>
+            <a:pPr lvl="1">
+              <a:spcBef>
+                <a:spcPts val="200"/>
+              </a:spcBef>
+            </a:pPr>
+            <a:r>
+              <a:rPr lang="en-US" dirty="0">
+                <a:cs typeface="Courier New" panose="02070309020205020404" pitchFamily="49" charset="0"/>
+              </a:rPr>
+              <a:t> Switch which version (</a:t>
+            </a:r>
+            <a:r>
+              <a:rPr lang="en-US" dirty="0">
+                <a:latin typeface="Courier New" panose="02070309020205020404" pitchFamily="49" charset="0"/>
+                <a:cs typeface="Courier New" panose="02070309020205020404" pitchFamily="49" charset="0"/>
+              </a:rPr>
+              <a:t>master</a:t>
+            </a:r>
+            <a:r>
+              <a:rPr lang="en-US" dirty="0">
+                <a:cs typeface="Courier New" panose="02070309020205020404" pitchFamily="49" charset="0"/>
+              </a:rPr>
+              <a:t>/</a:t>
+            </a:r>
+            <a:r>
+              <a:rPr lang="en-US" dirty="0">
+                <a:latin typeface="Courier New" panose="02070309020205020404" pitchFamily="49" charset="0"/>
+                <a:cs typeface="Courier New" panose="02070309020205020404" pitchFamily="49" charset="0"/>
+              </a:rPr>
+              <a:t>test</a:t>
+            </a:r>
+            <a:r>
+              <a:rPr lang="en-US" dirty="0">
+                <a:cs typeface="Courier New" panose="02070309020205020404" pitchFamily="49" charset="0"/>
+              </a:rPr>
+              <a:t>) with git software</a:t>
+            </a:r>
           </a:p>
         </p:txBody>
       </p:sp>

</xml_diff>